<commit_message>
Added notes to the team presentation
</commit_message>
<xml_diff>
--- a/docs/TeamPresentation.pptx
+++ b/docs/TeamPresentation.pptx
@@ -10,8 +10,8 @@
     <p:sldId id="270" r:id="rId4"/>
     <p:sldId id="275" r:id="rId5"/>
     <p:sldId id="257" r:id="rId6"/>
-    <p:sldId id="268" r:id="rId7"/>
-    <p:sldId id="258" r:id="rId8"/>
+    <p:sldId id="258" r:id="rId7"/>
+    <p:sldId id="268" r:id="rId8"/>
     <p:sldId id="259" r:id="rId9"/>
     <p:sldId id="260" r:id="rId10"/>
     <p:sldId id="271" r:id="rId11"/>
@@ -5394,7 +5394,7 @@
         </p:blipFill>
         <p:spPr>
           <a:xfrm>
-            <a:off x="942392" y="879321"/>
+            <a:off x="925614" y="787042"/>
             <a:ext cx="10608906" cy="5978679"/>
           </a:xfrm>
         </p:spPr>
@@ -6614,15 +6614,7 @@
           <a:p>
             <a:r>
               <a:rPr lang="en-US" dirty="0"/>
-              <a:t>Adapting/</a:t>
-            </a:r>
-            <a:r>
-              <a:rPr lang="en-US" dirty="0" err="1"/>
-              <a:t>Impleting</a:t>
-            </a:r>
-            <a:r>
-              <a:rPr lang="en-US" dirty="0"/>
-              <a:t> Agile (Scrum)</a:t>
+              <a:t>Adapting/Implementing Agile (Scrum)</a:t>
             </a:r>
           </a:p>
           <a:p>
@@ -6781,7 +6773,12 @@
             <p:ph type="title"/>
           </p:nvPr>
         </p:nvSpPr>
-        <p:spPr/>
+        <p:spPr>
+          <a:xfrm>
+            <a:off x="4724400" y="720013"/>
+            <a:ext cx="6019800" cy="1143000"/>
+          </a:xfrm>
+        </p:spPr>
         <p:txBody>
           <a:bodyPr/>
           <a:lstStyle/>
@@ -6792,24 +6789,6 @@
             </a:r>
           </a:p>
         </p:txBody>
-      </p:sp>
-      <p:sp>
-        <p:nvSpPr>
-          <p:cNvPr id="3" name="Picture Placeholder 2">
-            <a:extLst>
-              <a:ext uri="{FF2B5EF4-FFF2-40B4-BE49-F238E27FC236}">
-                <a16:creationId xmlns:a16="http://schemas.microsoft.com/office/drawing/2014/main" id="{6F4D719E-E34B-4862-BE5D-C3D3491CB406}"/>
-              </a:ext>
-            </a:extLst>
-          </p:cNvPr>
-          <p:cNvSpPr>
-            <a:spLocks noGrp="1"/>
-          </p:cNvSpPr>
-          <p:nvPr>
-            <p:ph type="pic" idx="1"/>
-          </p:nvPr>
-        </p:nvSpPr>
-        <p:spPr/>
       </p:sp>
       <p:sp>
         <p:nvSpPr>
@@ -6897,6 +6876,36 @@
           </a:p>
         </p:txBody>
       </p:sp>
+      <p:pic>
+        <p:nvPicPr>
+          <p:cNvPr id="9" name="Picture 8">
+            <a:extLst>
+              <a:ext uri="{FF2B5EF4-FFF2-40B4-BE49-F238E27FC236}">
+                <a16:creationId xmlns:a16="http://schemas.microsoft.com/office/drawing/2014/main" id="{81D800CB-4575-49D7-A610-978F0BDFEB42}"/>
+              </a:ext>
+            </a:extLst>
+          </p:cNvPr>
+          <p:cNvPicPr>
+            <a:picLocks noChangeAspect="1"/>
+          </p:cNvPicPr>
+          <p:nvPr/>
+        </p:nvPicPr>
+        <p:blipFill>
+          <a:blip r:embed="rId2"/>
+          <a:stretch>
+            <a:fillRect/>
+          </a:stretch>
+        </p:blipFill>
+        <p:spPr>
+          <a:xfrm>
+            <a:off x="0" y="0"/>
+            <a:ext cx="4593056" cy="6858000"/>
+          </a:xfrm>
+          <a:prstGeom prst="rect">
+            <a:avLst/>
+          </a:prstGeom>
+        </p:spPr>
+      </p:pic>
     </p:spTree>
     <p:extLst>
       <p:ext uri="{BB962C8B-B14F-4D97-AF65-F5344CB8AC3E}">
@@ -6932,7 +6941,7 @@
           <p:cNvPr id="2" name="Title 1">
             <a:extLst>
               <a:ext uri="{FF2B5EF4-FFF2-40B4-BE49-F238E27FC236}">
-                <a16:creationId xmlns:a16="http://schemas.microsoft.com/office/drawing/2014/main" id="{3B6972E3-0AE3-43BD-B128-F805B07D2C45}"/>
+                <a16:creationId xmlns:a16="http://schemas.microsoft.com/office/drawing/2014/main" id="{6F6625E4-90F1-4CC2-828A-5BF4E5D419DD}"/>
               </a:ext>
             </a:extLst>
           </p:cNvPr>
@@ -6943,7 +6952,12 @@
             <p:ph type="title"/>
           </p:nvPr>
         </p:nvSpPr>
-        <p:spPr/>
+        <p:spPr>
+          <a:xfrm>
+            <a:off x="777418" y="603422"/>
+            <a:ext cx="6019800" cy="1143000"/>
+          </a:xfrm>
+        </p:spPr>
         <p:txBody>
           <a:bodyPr/>
           <a:lstStyle/>
@@ -6961,10 +6975,10 @@
       </p:sp>
       <p:sp>
         <p:nvSpPr>
-          <p:cNvPr id="3" name="Picture Placeholder 2">
+          <p:cNvPr id="4" name="Text Placeholder 3">
             <a:extLst>
               <a:ext uri="{FF2B5EF4-FFF2-40B4-BE49-F238E27FC236}">
-                <a16:creationId xmlns:a16="http://schemas.microsoft.com/office/drawing/2014/main" id="{6F4D719E-E34B-4862-BE5D-C3D3491CB406}"/>
+                <a16:creationId xmlns:a16="http://schemas.microsoft.com/office/drawing/2014/main" id="{85D9AFD6-FBEA-46BE-B971-9E8E5176E6C3}"/>
               </a:ext>
             </a:extLst>
           </p:cNvPr>
@@ -6972,41 +6986,57 @@
             <a:spLocks noGrp="1"/>
           </p:cNvSpPr>
           <p:nvPr>
-            <p:ph type="pic" idx="1"/>
-          </p:nvPr>
-        </p:nvSpPr>
-        <p:spPr/>
-      </p:sp>
-      <p:sp>
-        <p:nvSpPr>
-          <p:cNvPr id="4" name="Text Placeholder 3">
-            <a:extLst>
-              <a:ext uri="{FF2B5EF4-FFF2-40B4-BE49-F238E27FC236}">
-                <a16:creationId xmlns:a16="http://schemas.microsoft.com/office/drawing/2014/main" id="{35CD01A0-7B71-4E8A-8141-DCF2C884ABD9}"/>
-              </a:ext>
-            </a:extLst>
-          </p:cNvPr>
-          <p:cNvSpPr>
-            <a:spLocks noGrp="1"/>
-          </p:cNvSpPr>
-          <p:nvPr>
             <p:ph type="body" sz="half" idx="2"/>
           </p:nvPr>
         </p:nvSpPr>
-        <p:spPr/>
+        <p:spPr>
+          <a:xfrm>
+            <a:off x="551895" y="1963334"/>
+            <a:ext cx="8852164" cy="2048933"/>
+          </a:xfrm>
+        </p:spPr>
         <p:txBody>
           <a:bodyPr/>
           <a:lstStyle/>
           <a:p>
-            <a:pPr marL="285750" indent="-285750">
-              <a:buFont typeface="Wingdings" panose="05000000000000000000" pitchFamily="2" charset="2"/>
-              <a:buChar char="q"/>
-            </a:pPr>
-            <a:endParaRPr lang="en-US" dirty="0">
-              <a:solidFill>
-                <a:schemeClr val="tx1"/>
-              </a:solidFill>
-            </a:endParaRPr>
+            <a:r>
+              <a:rPr lang="en-US" b="1" dirty="0">
+                <a:solidFill>
+                  <a:schemeClr val="tx1"/>
+                </a:solidFill>
+              </a:rPr>
+              <a:t>Allowing users to reserve tools falls in the following requirements definitions:</a:t>
+            </a:r>
+          </a:p>
+          <a:p>
+            <a:r>
+              <a:rPr lang="en-US" dirty="0">
+                <a:solidFill>
+                  <a:schemeClr val="tx1"/>
+                </a:solidFill>
+              </a:rPr>
+              <a:t>MOSCOW 				=&gt; Should</a:t>
+            </a:r>
+          </a:p>
+          <a:p>
+            <a:r>
+              <a:rPr lang="en-US" dirty="0">
+                <a:solidFill>
+                  <a:schemeClr val="tx1"/>
+                </a:solidFill>
+              </a:rPr>
+              <a:t>FURPS					=&gt; Functional, Usable, Reliable</a:t>
+            </a:r>
+          </a:p>
+          <a:p>
+            <a:r>
+              <a:rPr lang="en-US" dirty="0">
+                <a:solidFill>
+                  <a:schemeClr val="tx1"/>
+                </a:solidFill>
+              </a:rPr>
+              <a:t>Audience Orientation	=&gt; Audience</a:t>
+            </a:r>
           </a:p>
         </p:txBody>
       </p:sp>
@@ -7015,7 +7045,7 @@
           <p:cNvPr id="5" name="TextBox 4">
             <a:extLst>
               <a:ext uri="{FF2B5EF4-FFF2-40B4-BE49-F238E27FC236}">
-                <a16:creationId xmlns:a16="http://schemas.microsoft.com/office/drawing/2014/main" id="{51652DED-DF43-4081-A0F5-6CADC82BBEF7}"/>
+                <a16:creationId xmlns:a16="http://schemas.microsoft.com/office/drawing/2014/main" id="{435E1911-6EB5-4FBE-89E5-095E57C54BDD}"/>
               </a:ext>
             </a:extLst>
           </p:cNvPr>
@@ -7024,8 +7054,8 @@
         </p:nvSpPr>
         <p:spPr>
           <a:xfrm>
-            <a:off x="9739618" y="444616"/>
-            <a:ext cx="2365696" cy="369332"/>
+            <a:off x="537766" y="4161453"/>
+            <a:ext cx="8826760" cy="1754326"/>
           </a:xfrm>
           <a:prstGeom prst="rect">
             <a:avLst/>
@@ -7040,7 +7070,16 @@
           <a:p>
             <a:r>
               <a:rPr lang="en-US" dirty="0"/>
-              <a:t>Josh</a:t>
+              <a:t>Joe stated that his top priority was to be able to keep track of the toolshed inventory as well as record when a tool was checked out and to whom.</a:t>
+            </a:r>
+          </a:p>
+          <a:p>
+            <a:endParaRPr lang="en-US" dirty="0"/>
+          </a:p>
+          <a:p>
+            <a:r>
+              <a:rPr lang="en-US" dirty="0"/>
+              <a:t>While allowing users to reserve tools was not essential to accomplish that task, we believed it should be implemented as an easier way to keep track of supply and demand of the tool inventory. </a:t>
             </a:r>
           </a:p>
         </p:txBody>
@@ -7048,7 +7087,7 @@
     </p:spTree>
     <p:extLst>
       <p:ext uri="{BB962C8B-B14F-4D97-AF65-F5344CB8AC3E}">
-        <p14:creationId xmlns:p14="http://schemas.microsoft.com/office/powerpoint/2010/main" val="3567459847"/>
+        <p14:creationId xmlns:p14="http://schemas.microsoft.com/office/powerpoint/2010/main" val="1926698048"/>
       </p:ext>
     </p:extLst>
   </p:cSld>
@@ -7080,7 +7119,7 @@
           <p:cNvPr id="2" name="Title 1">
             <a:extLst>
               <a:ext uri="{FF2B5EF4-FFF2-40B4-BE49-F238E27FC236}">
-                <a16:creationId xmlns:a16="http://schemas.microsoft.com/office/drawing/2014/main" id="{6F6625E4-90F1-4CC2-828A-5BF4E5D419DD}"/>
+                <a16:creationId xmlns:a16="http://schemas.microsoft.com/office/drawing/2014/main" id="{3B6972E3-0AE3-43BD-B128-F805B07D2C45}"/>
               </a:ext>
             </a:extLst>
           </p:cNvPr>
@@ -7091,7 +7130,12 @@
             <p:ph type="title"/>
           </p:nvPr>
         </p:nvSpPr>
-        <p:spPr/>
+        <p:spPr>
+          <a:xfrm>
+            <a:off x="880654" y="629282"/>
+            <a:ext cx="6019800" cy="1143000"/>
+          </a:xfrm>
+        </p:spPr>
         <p:txBody>
           <a:bodyPr/>
           <a:lstStyle/>
@@ -7109,10 +7153,10 @@
       </p:sp>
       <p:sp>
         <p:nvSpPr>
-          <p:cNvPr id="3" name="Picture Placeholder 2">
+          <p:cNvPr id="4" name="Text Placeholder 3">
             <a:extLst>
               <a:ext uri="{FF2B5EF4-FFF2-40B4-BE49-F238E27FC236}">
-                <a16:creationId xmlns:a16="http://schemas.microsoft.com/office/drawing/2014/main" id="{E9A8ACB1-81F4-4BB3-B9E6-745EB367E9D1}"/>
+                <a16:creationId xmlns:a16="http://schemas.microsoft.com/office/drawing/2014/main" id="{35CD01A0-7B71-4E8A-8141-DCF2C884ABD9}"/>
               </a:ext>
             </a:extLst>
           </p:cNvPr>
@@ -7120,40 +7164,106 @@
             <a:spLocks noGrp="1"/>
           </p:cNvSpPr>
           <p:nvPr>
-            <p:ph type="pic" idx="1"/>
-          </p:nvPr>
-        </p:nvSpPr>
-        <p:spPr/>
-      </p:sp>
-      <p:sp>
-        <p:nvSpPr>
-          <p:cNvPr id="4" name="Text Placeholder 3">
-            <a:extLst>
-              <a:ext uri="{FF2B5EF4-FFF2-40B4-BE49-F238E27FC236}">
-                <a16:creationId xmlns:a16="http://schemas.microsoft.com/office/drawing/2014/main" id="{85D9AFD6-FBEA-46BE-B971-9E8E5176E6C3}"/>
-              </a:ext>
-            </a:extLst>
-          </p:cNvPr>
-          <p:cNvSpPr>
-            <a:spLocks noGrp="1"/>
-          </p:cNvSpPr>
-          <p:nvPr>
             <p:ph type="body" sz="half" idx="2"/>
           </p:nvPr>
         </p:nvSpPr>
-        <p:spPr/>
-        <p:txBody>
-          <a:bodyPr/>
-          <a:lstStyle/>
-          <a:p>
-            <a:endParaRPr lang="en-US"/>
+        <p:spPr>
+          <a:xfrm>
+            <a:off x="880654" y="2248560"/>
+            <a:ext cx="10788433" cy="4336798"/>
+          </a:xfrm>
+        </p:spPr>
+        <p:txBody>
+          <a:bodyPr>
+            <a:normAutofit/>
+          </a:bodyPr>
+          <a:lstStyle/>
+          <a:p>
+            <a:r>
+              <a:rPr lang="en-US" dirty="0">
+                <a:solidFill>
+                  <a:schemeClr val="tx1"/>
+                </a:solidFill>
+              </a:rPr>
+              <a:t>Scrum Tasks: 												Assigned		FURPS</a:t>
+            </a:r>
+          </a:p>
+          <a:p>
+            <a:pPr marL="285750" indent="-285750">
+              <a:buFont typeface="Wingdings" panose="05000000000000000000" pitchFamily="2" charset="2"/>
+              <a:buChar char="q"/>
+            </a:pPr>
+            <a:r>
+              <a:rPr lang="en-US" dirty="0">
+                <a:solidFill>
+                  <a:schemeClr val="tx1"/>
+                </a:solidFill>
+              </a:rPr>
+              <a:t>Create an inventory list/Initialize the database				-Ian/Liz			F</a:t>
+            </a:r>
+          </a:p>
+          <a:p>
+            <a:pPr marL="285750" indent="-285750">
+              <a:buFont typeface="Wingdings" panose="05000000000000000000" pitchFamily="2" charset="2"/>
+              <a:buChar char="q"/>
+            </a:pPr>
+            <a:r>
+              <a:rPr lang="en-US" dirty="0">
+                <a:solidFill>
+                  <a:schemeClr val="tx1"/>
+                </a:solidFill>
+              </a:rPr>
+              <a:t>Create user profiles/sign in page							- Liz				U</a:t>
+            </a:r>
+          </a:p>
+          <a:p>
+            <a:pPr marL="285750" indent="-285750">
+              <a:buFont typeface="Wingdings" panose="05000000000000000000" pitchFamily="2" charset="2"/>
+              <a:buChar char="q"/>
+            </a:pPr>
+            <a:r>
+              <a:rPr lang="en-US" dirty="0">
+                <a:solidFill>
+                  <a:schemeClr val="tx1"/>
+                </a:solidFill>
+              </a:rPr>
+              <a:t>Create a page to display the inventory list					- Liz				F</a:t>
+            </a:r>
+          </a:p>
+          <a:p>
+            <a:pPr marL="285750" indent="-285750">
+              <a:buFont typeface="Wingdings" panose="05000000000000000000" pitchFamily="2" charset="2"/>
+              <a:buChar char="q"/>
+            </a:pPr>
+            <a:r>
+              <a:rPr lang="en-US" dirty="0">
+                <a:solidFill>
+                  <a:schemeClr val="tx1"/>
+                </a:solidFill>
+              </a:rPr>
+              <a:t>Create a user reservation page							- Liz				F/U</a:t>
+            </a:r>
+          </a:p>
+          <a:p>
+            <a:pPr marL="285750" indent="-285750">
+              <a:buFont typeface="Wingdings" panose="05000000000000000000" pitchFamily="2" charset="2"/>
+              <a:buChar char="q"/>
+            </a:pPr>
+            <a:r>
+              <a:rPr lang="en-US" dirty="0">
+                <a:solidFill>
+                  <a:schemeClr val="tx1"/>
+                </a:solidFill>
+              </a:rPr>
+              <a:t>Create a modal to confirm a submission was accepted 	- Ian			F/U/R</a:t>
+            </a:r>
           </a:p>
         </p:txBody>
       </p:sp>
     </p:spTree>
     <p:extLst>
       <p:ext uri="{BB962C8B-B14F-4D97-AF65-F5344CB8AC3E}">
-        <p14:creationId xmlns:p14="http://schemas.microsoft.com/office/powerpoint/2010/main" val="1926698048"/>
+        <p14:creationId xmlns:p14="http://schemas.microsoft.com/office/powerpoint/2010/main" val="3567459847"/>
       </p:ext>
     </p:extLst>
   </p:cSld>
@@ -7196,7 +7306,12 @@
             <p:ph type="title"/>
           </p:nvPr>
         </p:nvSpPr>
-        <p:spPr/>
+        <p:spPr>
+          <a:xfrm>
+            <a:off x="813286" y="580054"/>
+            <a:ext cx="6019800" cy="1143000"/>
+          </a:xfrm>
+        </p:spPr>
         <p:txBody>
           <a:bodyPr/>
           <a:lstStyle/>
@@ -7211,24 +7326,6 @@
             <a:endParaRPr lang="en-US" dirty="0"/>
           </a:p>
         </p:txBody>
-      </p:sp>
-      <p:sp>
-        <p:nvSpPr>
-          <p:cNvPr id="3" name="Picture Placeholder 2">
-            <a:extLst>
-              <a:ext uri="{FF2B5EF4-FFF2-40B4-BE49-F238E27FC236}">
-                <a16:creationId xmlns:a16="http://schemas.microsoft.com/office/drawing/2014/main" id="{9E2A5876-F6EB-4A65-A2DD-F03C4E421C61}"/>
-              </a:ext>
-            </a:extLst>
-          </p:cNvPr>
-          <p:cNvSpPr>
-            <a:spLocks noGrp="1"/>
-          </p:cNvSpPr>
-          <p:nvPr>
-            <p:ph type="pic" idx="1"/>
-          </p:nvPr>
-        </p:nvSpPr>
-        <p:spPr/>
       </p:sp>
       <p:sp>
         <p:nvSpPr>
@@ -7246,12 +7343,77 @@
             <p:ph type="body" sz="half" idx="2"/>
           </p:nvPr>
         </p:nvSpPr>
-        <p:spPr/>
-        <p:txBody>
-          <a:bodyPr/>
-          <a:lstStyle/>
-          <a:p>
-            <a:endParaRPr lang="en-US"/>
+        <p:spPr>
+          <a:xfrm>
+            <a:off x="811698" y="1723054"/>
+            <a:ext cx="9498372" cy="4870693"/>
+          </a:xfrm>
+        </p:spPr>
+        <p:txBody>
+          <a:bodyPr>
+            <a:normAutofit/>
+          </a:bodyPr>
+          <a:lstStyle/>
+          <a:p>
+            <a:r>
+              <a:rPr lang="en-US" dirty="0">
+                <a:solidFill>
+                  <a:schemeClr val="tx1"/>
+                </a:solidFill>
+              </a:rPr>
+              <a:t>These tasks were completed intermittently through out the various sprints of phase 3 with the last being completed during the final phase of testing and development. Following the completion of phase 3.</a:t>
+            </a:r>
+          </a:p>
+          <a:p>
+            <a:endParaRPr lang="en-US" dirty="0">
+              <a:solidFill>
+                <a:schemeClr val="tx1"/>
+              </a:solidFill>
+            </a:endParaRPr>
+          </a:p>
+          <a:p>
+            <a:r>
+              <a:rPr lang="en-US" dirty="0">
+                <a:solidFill>
+                  <a:schemeClr val="tx1"/>
+                </a:solidFill>
+              </a:rPr>
+              <a:t>The inventory list was put together during the first sprint, with the page to display being created during the second sprint. </a:t>
+            </a:r>
+          </a:p>
+          <a:p>
+            <a:endParaRPr lang="en-US" dirty="0">
+              <a:solidFill>
+                <a:schemeClr val="tx1"/>
+              </a:solidFill>
+            </a:endParaRPr>
+          </a:p>
+          <a:p>
+            <a:r>
+              <a:rPr lang="en-US" dirty="0">
+                <a:solidFill>
+                  <a:schemeClr val="tx1"/>
+                </a:solidFill>
+              </a:rPr>
+              <a:t>The User profile pages and sign in pages were also completed during the first sprint. The user reservation page was also created at this time, but was also polished during the third sprint.</a:t>
+            </a:r>
+          </a:p>
+          <a:p>
+            <a:endParaRPr lang="en-US" dirty="0">
+              <a:solidFill>
+                <a:schemeClr val="tx1"/>
+              </a:solidFill>
+            </a:endParaRPr>
+          </a:p>
+          <a:p>
+            <a:r>
+              <a:rPr lang="en-US" dirty="0">
+                <a:solidFill>
+                  <a:schemeClr val="tx1"/>
+                </a:solidFill>
+              </a:rPr>
+              <a:t>The modal to alert users their order had been accepted was completed shortly after the completion of phase 3 of this project.</a:t>
+            </a:r>
           </a:p>
         </p:txBody>
       </p:sp>

</xml_diff>

<commit_message>
Made rough slides for checking tools in/out
</commit_message>
<xml_diff>
--- a/docs/TeamPresentation.pptx
+++ b/docs/TeamPresentation.pptx
@@ -5655,7 +5655,7 @@
         </p:nvSpPr>
         <p:spPr>
           <a:xfrm>
-            <a:off x="4722812" y="1447800"/>
+            <a:off x="491634" y="333920"/>
             <a:ext cx="7315390" cy="557169"/>
           </a:xfrm>
         </p:spPr>
@@ -5669,24 +5669,6 @@
             </a:r>
           </a:p>
         </p:txBody>
-      </p:sp>
-      <p:sp>
-        <p:nvSpPr>
-          <p:cNvPr id="3" name="Picture Placeholder 2">
-            <a:extLst>
-              <a:ext uri="{FF2B5EF4-FFF2-40B4-BE49-F238E27FC236}">
-                <a16:creationId xmlns:a16="http://schemas.microsoft.com/office/drawing/2014/main" id="{EF0FE5E1-0715-4961-8CED-D0710F3B7FD1}"/>
-              </a:ext>
-            </a:extLst>
-          </p:cNvPr>
-          <p:cNvSpPr>
-            <a:spLocks noGrp="1"/>
-          </p:cNvSpPr>
-          <p:nvPr>
-            <p:ph type="pic" idx="1"/>
-          </p:nvPr>
-        </p:nvSpPr>
-        <p:spPr/>
       </p:sp>
       <p:sp>
         <p:nvSpPr>
@@ -5704,12 +5686,56 @@
             <p:ph type="body" sz="half" idx="2"/>
           </p:nvPr>
         </p:nvSpPr>
-        <p:spPr/>
-        <p:txBody>
-          <a:bodyPr/>
-          <a:lstStyle/>
-          <a:p>
-            <a:endParaRPr lang="en-US"/>
+        <p:spPr>
+          <a:xfrm>
+            <a:off x="549822" y="1189335"/>
+            <a:ext cx="10148657" cy="4920520"/>
+          </a:xfrm>
+        </p:spPr>
+        <p:txBody>
+          <a:bodyPr>
+            <a:normAutofit/>
+          </a:bodyPr>
+          <a:lstStyle/>
+          <a:p>
+            <a:r>
+              <a:rPr lang="en-US" dirty="0">
+                <a:solidFill>
+                  <a:schemeClr val="tx1"/>
+                </a:solidFill>
+              </a:rPr>
+              <a:t>THE REQUIREMENT:</a:t>
+            </a:r>
+          </a:p>
+          <a:p>
+            <a:r>
+              <a:rPr lang="en-US" dirty="0">
+                <a:solidFill>
+                  <a:schemeClr val="tx1"/>
+                </a:solidFill>
+              </a:rPr>
+              <a:t>	It was of upmost importance that the administrator, Joe, would have the ability and functionality within the application to directly check out tools to customers who came to the onsite location of the tool coop. </a:t>
+            </a:r>
+          </a:p>
+          <a:p>
+            <a:r>
+              <a:rPr lang="en-US" dirty="0">
+                <a:solidFill>
+                  <a:schemeClr val="tx1"/>
+                </a:solidFill>
+              </a:rPr>
+              <a:t>	This requirement is separate to customers reserving tools. Customers can still reserve tools online and then come to the onsite location to pick up their tools. This requirement allows Joe to serve customers who have not made any reservations on the application.</a:t>
+            </a:r>
+          </a:p>
+          <a:p>
+            <a:r>
+              <a:rPr lang="en-US" dirty="0">
+                <a:solidFill>
+                  <a:schemeClr val="tx1"/>
+                </a:solidFill>
+              </a:rPr>
+              <a:t>	With our implementation of this feature, customers still need an account on the application so Joe can fetch their profile, create a reservation for them, and then finally check their tools out.</a:t>
+            </a:r>
           </a:p>
         </p:txBody>
       </p:sp>
@@ -5796,7 +5822,7 @@
         </p:nvSpPr>
         <p:spPr>
           <a:xfrm>
-            <a:off x="4722812" y="1447800"/>
+            <a:off x="418116" y="325582"/>
             <a:ext cx="7315390" cy="557169"/>
           </a:xfrm>
         </p:spPr>
@@ -5810,24 +5836,6 @@
             </a:r>
           </a:p>
         </p:txBody>
-      </p:sp>
-      <p:sp>
-        <p:nvSpPr>
-          <p:cNvPr id="3" name="Picture Placeholder 2">
-            <a:extLst>
-              <a:ext uri="{FF2B5EF4-FFF2-40B4-BE49-F238E27FC236}">
-                <a16:creationId xmlns:a16="http://schemas.microsoft.com/office/drawing/2014/main" id="{EF0FE5E1-0715-4961-8CED-D0710F3B7FD1}"/>
-              </a:ext>
-            </a:extLst>
-          </p:cNvPr>
-          <p:cNvSpPr>
-            <a:spLocks noGrp="1"/>
-          </p:cNvSpPr>
-          <p:nvPr>
-            <p:ph type="pic" idx="1"/>
-          </p:nvPr>
-        </p:nvSpPr>
-        <p:spPr/>
       </p:sp>
       <p:sp>
         <p:nvSpPr>
@@ -5845,12 +5853,293 @@
             <p:ph type="body" sz="half" idx="2"/>
           </p:nvPr>
         </p:nvSpPr>
-        <p:spPr/>
-        <p:txBody>
-          <a:bodyPr/>
-          <a:lstStyle/>
-          <a:p>
-            <a:endParaRPr lang="en-US"/>
+        <p:spPr>
+          <a:xfrm>
+            <a:off x="483320" y="1164397"/>
+            <a:ext cx="8752119" cy="5368021"/>
+          </a:xfrm>
+        </p:spPr>
+        <p:txBody>
+          <a:bodyPr>
+            <a:normAutofit fontScale="92500" lnSpcReduction="20000"/>
+          </a:bodyPr>
+          <a:lstStyle/>
+          <a:p>
+            <a:r>
+              <a:rPr lang="en-US" dirty="0">
+                <a:solidFill>
+                  <a:schemeClr val="tx1"/>
+                </a:solidFill>
+              </a:rPr>
+              <a:t>FURPS (Functionality, Usability, Reliability, Performance, Supportability)</a:t>
+            </a:r>
+          </a:p>
+          <a:p>
+            <a:pPr marL="285750" indent="-285750">
+              <a:buFont typeface="Arial" panose="020B0604020202020204" pitchFamily="34" charset="0"/>
+              <a:buChar char="•"/>
+            </a:pPr>
+            <a:r>
+              <a:rPr lang="en-US" sz="1100" dirty="0">
+                <a:solidFill>
+                  <a:schemeClr val="tx1"/>
+                </a:solidFill>
+              </a:rPr>
+              <a:t>Admin ability to reserve tools</a:t>
+            </a:r>
+          </a:p>
+          <a:p>
+            <a:pPr marL="285750" indent="-285750">
+              <a:buFont typeface="Arial" panose="020B0604020202020204" pitchFamily="34" charset="0"/>
+              <a:buChar char="•"/>
+            </a:pPr>
+            <a:r>
+              <a:rPr lang="en-US" sz="1100" dirty="0">
+                <a:solidFill>
+                  <a:schemeClr val="tx1"/>
+                </a:solidFill>
+              </a:rPr>
+              <a:t>Admin ability to check out/check in tools</a:t>
+            </a:r>
+          </a:p>
+          <a:p>
+            <a:pPr marL="285750" indent="-285750">
+              <a:buFont typeface="Arial" panose="020B0604020202020204" pitchFamily="34" charset="0"/>
+              <a:buChar char="•"/>
+            </a:pPr>
+            <a:r>
+              <a:rPr lang="en-US" sz="1100" dirty="0">
+                <a:solidFill>
+                  <a:schemeClr val="tx1"/>
+                </a:solidFill>
+              </a:rPr>
+              <a:t>Application should keep track of how many tools in system</a:t>
+            </a:r>
+          </a:p>
+          <a:p>
+            <a:pPr marL="285750" indent="-285750">
+              <a:buFont typeface="Arial" panose="020B0604020202020204" pitchFamily="34" charset="0"/>
+              <a:buChar char="•"/>
+            </a:pPr>
+            <a:r>
+              <a:rPr lang="en-US" sz="1100" dirty="0">
+                <a:solidFill>
+                  <a:schemeClr val="tx1"/>
+                </a:solidFill>
+              </a:rPr>
+              <a:t>Application should</a:t>
+            </a:r>
+          </a:p>
+          <a:p>
+            <a:pPr marL="285750" indent="-285750">
+              <a:buFont typeface="Arial" panose="020B0604020202020204" pitchFamily="34" charset="0"/>
+              <a:buChar char="•"/>
+            </a:pPr>
+            <a:r>
+              <a:rPr lang="en-US" sz="1100" dirty="0">
+                <a:solidFill>
+                  <a:schemeClr val="tx1"/>
+                </a:solidFill>
+              </a:rPr>
+              <a:t>Joe should be an Admin user</a:t>
+            </a:r>
+          </a:p>
+          <a:p>
+            <a:pPr marL="285750" indent="-285750">
+              <a:buFont typeface="Arial" panose="020B0604020202020204" pitchFamily="34" charset="0"/>
+              <a:buChar char="•"/>
+            </a:pPr>
+            <a:r>
+              <a:rPr lang="en-US" sz="1100" dirty="0">
+                <a:solidFill>
+                  <a:schemeClr val="tx1"/>
+                </a:solidFill>
+              </a:rPr>
+              <a:t>Admin ability to extend due dates of reservations</a:t>
+            </a:r>
+          </a:p>
+          <a:p>
+            <a:pPr marL="285750" indent="-285750">
+              <a:buFont typeface="Arial" panose="020B0604020202020204" pitchFamily="34" charset="0"/>
+              <a:buChar char="•"/>
+            </a:pPr>
+            <a:r>
+              <a:rPr lang="en-US" sz="1100" dirty="0">
+                <a:solidFill>
+                  <a:schemeClr val="tx1"/>
+                </a:solidFill>
+              </a:rPr>
+              <a:t>Admin ability to add/modify/remove tools in the inventory</a:t>
+            </a:r>
+            <a:endParaRPr lang="en-US" sz="1600" dirty="0">
+              <a:solidFill>
+                <a:schemeClr val="tx1"/>
+              </a:solidFill>
+            </a:endParaRPr>
+          </a:p>
+          <a:p>
+            <a:r>
+              <a:rPr lang="en-US" dirty="0">
+                <a:solidFill>
+                  <a:schemeClr val="tx1"/>
+                </a:solidFill>
+              </a:rPr>
+              <a:t>MOSCOW (Must, Should, Could, Won’t)</a:t>
+            </a:r>
+          </a:p>
+          <a:p>
+            <a:pPr marL="285750" indent="-285750">
+              <a:buFont typeface="Arial" panose="020B0604020202020204" pitchFamily="34" charset="0"/>
+              <a:buChar char="•"/>
+            </a:pPr>
+            <a:r>
+              <a:rPr lang="en-US" dirty="0">
+                <a:solidFill>
+                  <a:schemeClr val="tx1"/>
+                </a:solidFill>
+              </a:rPr>
+              <a:t>MUST</a:t>
+            </a:r>
+          </a:p>
+          <a:p>
+            <a:pPr marL="742950" lvl="1" indent="-285750">
+              <a:buFont typeface="Arial" panose="020B0604020202020204" pitchFamily="34" charset="0"/>
+              <a:buChar char="•"/>
+            </a:pPr>
+            <a:r>
+              <a:rPr lang="en-US" dirty="0">
+                <a:solidFill>
+                  <a:schemeClr val="tx1"/>
+                </a:solidFill>
+              </a:rPr>
+              <a:t>Set Joe as admin user</a:t>
+            </a:r>
+          </a:p>
+          <a:p>
+            <a:pPr marL="742950" lvl="1" indent="-285750">
+              <a:buFont typeface="Arial" panose="020B0604020202020204" pitchFamily="34" charset="0"/>
+              <a:buChar char="•"/>
+            </a:pPr>
+            <a:r>
+              <a:rPr lang="en-US" dirty="0">
+                <a:solidFill>
+                  <a:schemeClr val="tx1"/>
+                </a:solidFill>
+              </a:rPr>
+              <a:t>Allow admin to check in/out tools</a:t>
+            </a:r>
+          </a:p>
+          <a:p>
+            <a:pPr marL="742950" lvl="1" indent="-285750">
+              <a:buFont typeface="Arial" panose="020B0604020202020204" pitchFamily="34" charset="0"/>
+              <a:buChar char="•"/>
+            </a:pPr>
+            <a:r>
+              <a:rPr lang="en-US" dirty="0">
+                <a:solidFill>
+                  <a:schemeClr val="tx1"/>
+                </a:solidFill>
+              </a:rPr>
+              <a:t>Do not allow admin to check out already reserved tools</a:t>
+            </a:r>
+          </a:p>
+          <a:p>
+            <a:pPr marL="285750" indent="-285750">
+              <a:buFont typeface="Arial" panose="020B0604020202020204" pitchFamily="34" charset="0"/>
+              <a:buChar char="•"/>
+            </a:pPr>
+            <a:r>
+              <a:rPr lang="en-US" dirty="0">
+                <a:solidFill>
+                  <a:schemeClr val="tx1"/>
+                </a:solidFill>
+              </a:rPr>
+              <a:t>SHOULD</a:t>
+            </a:r>
+          </a:p>
+          <a:p>
+            <a:pPr marL="742950" lvl="1" indent="-285750">
+              <a:buFont typeface="Arial" panose="020B0604020202020204" pitchFamily="34" charset="0"/>
+              <a:buChar char="•"/>
+            </a:pPr>
+            <a:r>
+              <a:rPr lang="en-US" dirty="0">
+                <a:solidFill>
+                  <a:schemeClr val="tx1"/>
+                </a:solidFill>
+              </a:rPr>
+              <a:t>Allow admin to add/modify/delete tools in inventory</a:t>
+            </a:r>
+          </a:p>
+          <a:p>
+            <a:pPr marL="742950" lvl="1" indent="-285750">
+              <a:buFont typeface="Arial" panose="020B0604020202020204" pitchFamily="34" charset="0"/>
+              <a:buChar char="•"/>
+            </a:pPr>
+            <a:r>
+              <a:rPr lang="en-US" dirty="0">
+                <a:solidFill>
+                  <a:schemeClr val="tx1"/>
+                </a:solidFill>
+              </a:rPr>
+              <a:t>Do not allow users to checkout tools if they have overdue tools</a:t>
+            </a:r>
+          </a:p>
+          <a:p>
+            <a:pPr marL="285750" indent="-285750">
+              <a:buFont typeface="Arial" panose="020B0604020202020204" pitchFamily="34" charset="0"/>
+              <a:buChar char="•"/>
+            </a:pPr>
+            <a:r>
+              <a:rPr lang="en-US" dirty="0">
+                <a:solidFill>
+                  <a:schemeClr val="tx1"/>
+                </a:solidFill>
+              </a:rPr>
+              <a:t>COULD</a:t>
+            </a:r>
+          </a:p>
+          <a:p>
+            <a:pPr marL="742950" lvl="1" indent="-285750">
+              <a:buFont typeface="Arial" panose="020B0604020202020204" pitchFamily="34" charset="0"/>
+              <a:buChar char="•"/>
+            </a:pPr>
+            <a:r>
+              <a:rPr lang="en-US" dirty="0">
+                <a:solidFill>
+                  <a:schemeClr val="tx1"/>
+                </a:solidFill>
+              </a:rPr>
+              <a:t>Allow admin to extend due dates</a:t>
+            </a:r>
+          </a:p>
+          <a:p>
+            <a:pPr marL="285750" indent="-285750">
+              <a:buFont typeface="Arial" panose="020B0604020202020204" pitchFamily="34" charset="0"/>
+              <a:buChar char="•"/>
+            </a:pPr>
+            <a:r>
+              <a:rPr lang="en-US" dirty="0">
+                <a:solidFill>
+                  <a:schemeClr val="tx1"/>
+                </a:solidFill>
+              </a:rPr>
+              <a:t>WONT</a:t>
+            </a:r>
+          </a:p>
+          <a:p>
+            <a:pPr marL="742950" lvl="1" indent="-285750">
+              <a:buFont typeface="Arial" panose="020B0604020202020204" pitchFamily="34" charset="0"/>
+              <a:buChar char="•"/>
+            </a:pPr>
+            <a:r>
+              <a:rPr lang="en-US" dirty="0">
+                <a:solidFill>
+                  <a:schemeClr val="tx1"/>
+                </a:solidFill>
+              </a:rPr>
+              <a:t>Create payment system for people to pay fees</a:t>
+            </a:r>
           </a:p>
         </p:txBody>
       </p:sp>
@@ -5902,7 +6191,7 @@
         </p:nvSpPr>
         <p:spPr>
           <a:xfrm>
-            <a:off x="4722812" y="1447800"/>
+            <a:off x="418116" y="333894"/>
             <a:ext cx="7315390" cy="557169"/>
           </a:xfrm>
         </p:spPr>
@@ -5916,24 +6205,6 @@
             </a:r>
           </a:p>
         </p:txBody>
-      </p:sp>
-      <p:sp>
-        <p:nvSpPr>
-          <p:cNvPr id="3" name="Picture Placeholder 2">
-            <a:extLst>
-              <a:ext uri="{FF2B5EF4-FFF2-40B4-BE49-F238E27FC236}">
-                <a16:creationId xmlns:a16="http://schemas.microsoft.com/office/drawing/2014/main" id="{EF0FE5E1-0715-4961-8CED-D0710F3B7FD1}"/>
-              </a:ext>
-            </a:extLst>
-          </p:cNvPr>
-          <p:cNvSpPr>
-            <a:spLocks noGrp="1"/>
-          </p:cNvSpPr>
-          <p:nvPr>
-            <p:ph type="pic" idx="1"/>
-          </p:nvPr>
-        </p:nvSpPr>
-        <p:spPr/>
       </p:sp>
       <p:sp>
         <p:nvSpPr>
@@ -5951,12 +6222,97 @@
             <p:ph type="body" sz="half" idx="2"/>
           </p:nvPr>
         </p:nvSpPr>
-        <p:spPr/>
+        <p:spPr>
+          <a:xfrm>
+            <a:off x="418116" y="1461532"/>
+            <a:ext cx="10262062" cy="3934936"/>
+          </a:xfrm>
+        </p:spPr>
         <p:txBody>
           <a:bodyPr/>
           <a:lstStyle/>
           <a:p>
-            <a:endParaRPr lang="en-US"/>
+            <a:r>
+              <a:rPr lang="en-US" dirty="0">
+                <a:solidFill>
+                  <a:schemeClr val="tx1"/>
+                </a:solidFill>
+              </a:rPr>
+              <a:t>Scrum Tasks: 												Assigned		FURPS</a:t>
+            </a:r>
+          </a:p>
+          <a:p>
+            <a:pPr marL="285750" indent="-285750">
+              <a:buFont typeface="Wingdings" panose="05000000000000000000" pitchFamily="2" charset="2"/>
+              <a:buChar char="q"/>
+            </a:pPr>
+            <a:r>
+              <a:rPr lang="en-US" dirty="0">
+                <a:solidFill>
+                  <a:schemeClr val="tx1"/>
+                </a:solidFill>
+              </a:rPr>
+              <a:t>Allow admin to see use records and reservations			-Anyone		U</a:t>
+            </a:r>
+          </a:p>
+          <a:p>
+            <a:pPr marL="285750" indent="-285750">
+              <a:buFont typeface="Wingdings" panose="05000000000000000000" pitchFamily="2" charset="2"/>
+              <a:buChar char="q"/>
+            </a:pPr>
+            <a:r>
+              <a:rPr lang="en-US" dirty="0">
+                <a:solidFill>
+                  <a:schemeClr val="tx1"/>
+                </a:solidFill>
+              </a:rPr>
+              <a:t>Allow Admin to checkout/in tools							- Liz				U</a:t>
+            </a:r>
+          </a:p>
+          <a:p>
+            <a:pPr marL="285750" indent="-285750">
+              <a:buFont typeface="Wingdings" panose="05000000000000000000" pitchFamily="2" charset="2"/>
+              <a:buChar char="q"/>
+            </a:pPr>
+            <a:r>
+              <a:rPr lang="en-US" dirty="0">
+                <a:solidFill>
+                  <a:schemeClr val="tx1"/>
+                </a:solidFill>
+              </a:rPr>
+              <a:t>Create checkout reservation page						- Liz				F/U</a:t>
+            </a:r>
+          </a:p>
+          <a:p>
+            <a:pPr marL="285750" indent="-285750">
+              <a:buFont typeface="Wingdings" panose="05000000000000000000" pitchFamily="2" charset="2"/>
+              <a:buChar char="q"/>
+            </a:pPr>
+            <a:r>
+              <a:rPr lang="en-US" dirty="0">
+                <a:solidFill>
+                  <a:schemeClr val="tx1"/>
+                </a:solidFill>
+              </a:rPr>
+              <a:t>Set Joe as an admin user on the application				- Josh			U/R</a:t>
+            </a:r>
+          </a:p>
+          <a:p>
+            <a:pPr marL="285750" indent="-285750">
+              <a:buFont typeface="Wingdings" panose="05000000000000000000" pitchFamily="2" charset="2"/>
+              <a:buChar char="q"/>
+            </a:pPr>
+            <a:r>
+              <a:rPr lang="en-US" dirty="0">
+                <a:solidFill>
+                  <a:schemeClr val="tx1"/>
+                </a:solidFill>
+              </a:rPr>
+              <a:t>Allow admin to extend the due dates on checkout log 		- Anyone		F/U/R</a:t>
+            </a:r>
+          </a:p>
+          <a:p>
+            <a:endParaRPr lang="en-US" dirty="0"/>
           </a:p>
         </p:txBody>
       </p:sp>

</xml_diff>